<commit_message>
final changes updating readme and ppt
</commit_message>
<xml_diff>
--- a/doc/Varun_Posimsetty_SAL_Presentation.pptx
+++ b/doc/Varun_Posimsetty_SAL_Presentation.pptx
@@ -3043,6 +3043,34 @@
 </dgm:styleDef>
 </file>
 
+<file path=ppt/ink/ink1.xml><?xml version="1.0" encoding="utf-8"?>
+<inkml:ink xmlns:inkml="http://www.w3.org/2003/InkML">
+  <inkml:definitions>
+    <inkml:context xml:id="ctx0">
+      <inkml:inkSource xml:id="inkSrc0">
+        <inkml:traceFormat>
+          <inkml:channel name="X" type="integer" min="-2.14748E9" max="2.14748E9" units="cm"/>
+          <inkml:channel name="Y" type="integer" min="-2.14748E9" max="2.14748E9" units="cm"/>
+          <inkml:channel name="F" type="integer" max="32767" units="dev"/>
+        </inkml:traceFormat>
+        <inkml:channelProperties>
+          <inkml:channelProperty channel="X" name="resolution" value="1000" units="1/cm"/>
+          <inkml:channelProperty channel="Y" name="resolution" value="1000" units="1/cm"/>
+          <inkml:channelProperty channel="F" name="resolution" value="0" units="1/dev"/>
+        </inkml:channelProperties>
+      </inkml:inkSource>
+      <inkml:timestamp xml:id="ts0" timeString="2026-02-08T15:18:44.589"/>
+    </inkml:context>
+    <inkml:brush xml:id="br0">
+      <inkml:brushProperty name="width" value="0.025" units="cm"/>
+      <inkml:brushProperty name="height" value="0.025" units="cm"/>
+      <inkml:brushProperty name="color" value="#FFFFFF"/>
+    </inkml:brush>
+  </inkml:definitions>
+  <inkml:trace contextRef="#ctx0" brushRef="#br0">181 0 24575,'0'4'0,"-1"1"0,-1 0 0,-1 1 0,-1-1 0,-1 1 0,1 1 0,-1-1 0,1-1 0,0 0 0,0 0 0,0 0 0,-2 4 0,-5 8 0,-5 8 0,-5 9 0,-3 5 0,3-4 0,4-5 0,5-9 0,5-8 0,4-6 0,1-3 0,2-3 0</inkml:trace>
+</inkml:ink>
+</file>
+
 <file path=ppt/notesMasters/notesMaster1.xml><?xml version="1.0" encoding="utf-8"?>
 <p:notesMaster xmlns:a="http://schemas.openxmlformats.org/drawingml/2006/main" xmlns:r="http://schemas.openxmlformats.org/officeDocument/2006/relationships" xmlns:p="http://schemas.openxmlformats.org/presentationml/2006/main">
   <p:cSld>
@@ -3125,7 +3153,7 @@
           <a:p>
             <a:fld id="{8EB95F86-F6F8-3842-A882-60577278DFBB}" type="datetimeFigureOut">
               <a:rPr lang="en-US" smtClean="0"/>
-              <a:t>2/5/26</a:t>
+              <a:t>2/7/26</a:t>
             </a:fld>
             <a:endParaRPr lang="en-US"/>
           </a:p>
@@ -5198,7 +5226,7 @@
           <a:p>
             <a:fld id="{224C4888-2709-FB4B-9A0E-0F33131364BF}" type="datetimeFigureOut">
               <a:rPr lang="en-US" smtClean="0"/>
-              <a:t>2/5/26</a:t>
+              <a:t>2/7/26</a:t>
             </a:fld>
             <a:endParaRPr lang="en-US"/>
           </a:p>
@@ -5398,7 +5426,7 @@
           <a:p>
             <a:fld id="{224C4888-2709-FB4B-9A0E-0F33131364BF}" type="datetimeFigureOut">
               <a:rPr lang="en-US" smtClean="0"/>
-              <a:t>2/5/26</a:t>
+              <a:t>2/7/26</a:t>
             </a:fld>
             <a:endParaRPr lang="en-US"/>
           </a:p>
@@ -5608,7 +5636,7 @@
           <a:p>
             <a:fld id="{224C4888-2709-FB4B-9A0E-0F33131364BF}" type="datetimeFigureOut">
               <a:rPr lang="en-US" smtClean="0"/>
-              <a:t>2/5/26</a:t>
+              <a:t>2/7/26</a:t>
             </a:fld>
             <a:endParaRPr lang="en-US"/>
           </a:p>
@@ -5808,7 +5836,7 @@
           <a:p>
             <a:fld id="{224C4888-2709-FB4B-9A0E-0F33131364BF}" type="datetimeFigureOut">
               <a:rPr lang="en-US" smtClean="0"/>
-              <a:t>2/5/26</a:t>
+              <a:t>2/7/26</a:t>
             </a:fld>
             <a:endParaRPr lang="en-US"/>
           </a:p>
@@ -6084,7 +6112,7 @@
           <a:p>
             <a:fld id="{224C4888-2709-FB4B-9A0E-0F33131364BF}" type="datetimeFigureOut">
               <a:rPr lang="en-US" smtClean="0"/>
-              <a:t>2/5/26</a:t>
+              <a:t>2/7/26</a:t>
             </a:fld>
             <a:endParaRPr lang="en-US"/>
           </a:p>
@@ -6352,7 +6380,7 @@
           <a:p>
             <a:fld id="{224C4888-2709-FB4B-9A0E-0F33131364BF}" type="datetimeFigureOut">
               <a:rPr lang="en-US" smtClean="0"/>
-              <a:t>2/5/26</a:t>
+              <a:t>2/7/26</a:t>
             </a:fld>
             <a:endParaRPr lang="en-US"/>
           </a:p>
@@ -6767,7 +6795,7 @@
           <a:p>
             <a:fld id="{224C4888-2709-FB4B-9A0E-0F33131364BF}" type="datetimeFigureOut">
               <a:rPr lang="en-US" smtClean="0"/>
-              <a:t>2/5/26</a:t>
+              <a:t>2/7/26</a:t>
             </a:fld>
             <a:endParaRPr lang="en-US"/>
           </a:p>
@@ -6909,7 +6937,7 @@
           <a:p>
             <a:fld id="{224C4888-2709-FB4B-9A0E-0F33131364BF}" type="datetimeFigureOut">
               <a:rPr lang="en-US" smtClean="0"/>
-              <a:t>2/5/26</a:t>
+              <a:t>2/7/26</a:t>
             </a:fld>
             <a:endParaRPr lang="en-US"/>
           </a:p>
@@ -7022,7 +7050,7 @@
           <a:p>
             <a:fld id="{224C4888-2709-FB4B-9A0E-0F33131364BF}" type="datetimeFigureOut">
               <a:rPr lang="en-US" smtClean="0"/>
-              <a:t>2/5/26</a:t>
+              <a:t>2/7/26</a:t>
             </a:fld>
             <a:endParaRPr lang="en-US"/>
           </a:p>
@@ -7335,7 +7363,7 @@
           <a:p>
             <a:fld id="{224C4888-2709-FB4B-9A0E-0F33131364BF}" type="datetimeFigureOut">
               <a:rPr lang="en-US" smtClean="0"/>
-              <a:t>2/5/26</a:t>
+              <a:t>2/7/26</a:t>
             </a:fld>
             <a:endParaRPr lang="en-US"/>
           </a:p>
@@ -7624,7 +7652,7 @@
           <a:p>
             <a:fld id="{224C4888-2709-FB4B-9A0E-0F33131364BF}" type="datetimeFigureOut">
               <a:rPr lang="en-US" smtClean="0"/>
-              <a:t>2/5/26</a:t>
+              <a:t>2/7/26</a:t>
             </a:fld>
             <a:endParaRPr lang="en-US"/>
           </a:p>
@@ -7867,7 +7895,7 @@
           <a:p>
             <a:fld id="{224C4888-2709-FB4B-9A0E-0F33131364BF}" type="datetimeFigureOut">
               <a:rPr lang="en-US" smtClean="0"/>
-              <a:t>2/5/26</a:t>
+              <a:t>2/7/26</a:t>
             </a:fld>
             <a:endParaRPr lang="en-US"/>
           </a:p>
@@ -9648,8 +9676,8 @@
         </p:nvSpPr>
         <p:spPr>
           <a:xfrm>
-            <a:off x="838200" y="1890428"/>
-            <a:ext cx="4685778" cy="4435216"/>
+            <a:off x="838200" y="1954586"/>
+            <a:ext cx="4614746" cy="4371058"/>
           </a:xfrm>
         </p:spPr>
         <p:txBody>
@@ -9680,6 +9708,15 @@
               <a:rPr lang="en-SG" sz="2400" dirty="0"/>
               <a:t> Prevents a new memory read or write while a calculation is in progress to avoid a data hazard.</a:t>
             </a:r>
+          </a:p>
+          <a:p>
+            <a:pPr marL="0" indent="0" algn="just">
+              <a:lnSpc>
+                <a:spcPct val="100000"/>
+              </a:lnSpc>
+              <a:buNone/>
+            </a:pPr>
+            <a:endParaRPr lang="en-SG" sz="2400" dirty="0"/>
           </a:p>
           <a:p>
             <a:pPr algn="just">
@@ -9768,6 +9805,57 @@
           </a:p>
         </p:txBody>
       </p:sp>
+      <mc:AlternateContent xmlns:mc="http://schemas.openxmlformats.org/markup-compatibility/2006">
+        <mc:Choice xmlns:p14="http://schemas.microsoft.com/office/powerpoint/2010/main" Requires="p14">
+          <p:contentPart p14:bwMode="auto" r:id="rId4">
+            <p14:nvContentPartPr>
+              <p14:cNvPr id="11" name="Ink 10">
+                <a:extLst>
+                  <a:ext uri="{FF2B5EF4-FFF2-40B4-BE49-F238E27FC236}">
+                    <a16:creationId xmlns:a16="http://schemas.microsoft.com/office/drawing/2014/main" id="{3A9042C7-FECD-4C5E-F9FF-FEBDE5E978DF}"/>
+                  </a:ext>
+                </a:extLst>
+              </p14:cNvPr>
+              <p14:cNvContentPartPr/>
+              <p14:nvPr/>
+            </p14:nvContentPartPr>
+            <p14:xfrm>
+              <a:off x="8158860" y="3979245"/>
+              <a:ext cx="65520" cy="108000"/>
+            </p14:xfrm>
+          </p:contentPart>
+        </mc:Choice>
+        <mc:Fallback>
+          <p:pic>
+            <p:nvPicPr>
+              <p:cNvPr id="11" name="Ink 10">
+                <a:extLst>
+                  <a:ext uri="{FF2B5EF4-FFF2-40B4-BE49-F238E27FC236}">
+                    <a16:creationId xmlns:a16="http://schemas.microsoft.com/office/drawing/2014/main" id="{3A9042C7-FECD-4C5E-F9FF-FEBDE5E978DF}"/>
+                  </a:ext>
+                </a:extLst>
+              </p:cNvPr>
+              <p:cNvPicPr/>
+              <p:nvPr/>
+            </p:nvPicPr>
+            <p:blipFill>
+              <a:blip r:embed="rId5"/>
+              <a:stretch>
+                <a:fillRect/>
+              </a:stretch>
+            </p:blipFill>
+            <p:spPr>
+              <a:xfrm>
+                <a:off x="8154540" y="3974925"/>
+                <a:ext cx="74160" cy="116640"/>
+              </a:xfrm>
+              <a:prstGeom prst="rect">
+                <a:avLst/>
+              </a:prstGeom>
+            </p:spPr>
+          </p:pic>
+        </mc:Fallback>
+      </mc:AlternateContent>
     </p:spTree>
     <p:extLst>
       <p:ext uri="{BB962C8B-B14F-4D97-AF65-F5344CB8AC3E}">
@@ -10563,13 +10651,13 @@
         </p:nvSpPr>
         <p:spPr>
           <a:xfrm>
-            <a:off x="838200" y="2181282"/>
-            <a:ext cx="4034426" cy="4276386"/>
+            <a:off x="669035" y="2133664"/>
+            <a:ext cx="4001429" cy="4276386"/>
           </a:xfrm>
         </p:spPr>
         <p:txBody>
           <a:bodyPr>
-            <a:normAutofit fontScale="92500" lnSpcReduction="10000"/>
+            <a:normAutofit fontScale="92500" lnSpcReduction="20000"/>
           </a:bodyPr>
           <a:lstStyle/>
           <a:p>
@@ -10592,6 +10680,15 @@
               <a:rPr lang="en-SG" sz="2400" dirty="0"/>
               <a:t> Removes FSM wait-states, allowing the MAC unit to produce one result per clock cycle.</a:t>
             </a:r>
+          </a:p>
+          <a:p>
+            <a:pPr marL="0" indent="0" algn="just">
+              <a:lnSpc>
+                <a:spcPct val="110000"/>
+              </a:lnSpc>
+              <a:buNone/>
+            </a:pPr>
+            <a:endParaRPr lang="en-SG" sz="2400" dirty="0"/>
           </a:p>
           <a:p>
             <a:pPr algn="just">
@@ -10627,14 +10724,15 @@
         </p:nvPicPr>
         <p:blipFill>
           <a:blip r:embed="rId3"/>
+          <a:srcRect l="1429" b="11799"/>
           <a:stretch>
             <a:fillRect/>
           </a:stretch>
         </p:blipFill>
         <p:spPr>
           <a:xfrm>
-            <a:off x="5760879" y="2592889"/>
-            <a:ext cx="5762086" cy="2946820"/>
+            <a:off x="5452946" y="2592889"/>
+            <a:ext cx="6578518" cy="3010418"/>
           </a:xfrm>
           <a:prstGeom prst="rect">
             <a:avLst/>
@@ -10655,7 +10753,7 @@
         </p:nvSpPr>
         <p:spPr>
           <a:xfrm>
-            <a:off x="6701572" y="5644856"/>
+            <a:off x="6701572" y="5722914"/>
             <a:ext cx="4821392" cy="369332"/>
           </a:xfrm>
           <a:prstGeom prst="rect">
@@ -12494,7 +12592,7 @@
         <p:spPr>
           <a:xfrm>
             <a:off x="838200" y="659556"/>
-            <a:ext cx="10439400" cy="1031132"/>
+            <a:ext cx="9922727" cy="1031132"/>
           </a:xfrm>
         </p:spPr>
         <p:txBody>
@@ -12513,7 +12611,7 @@
             </a:r>
             <a:r>
               <a:rPr lang="en-US" sz="3000" b="1" dirty="0"/>
-              <a:t> (Python Based)</a:t>
+              <a:t> </a:t>
             </a:r>
           </a:p>
         </p:txBody>
@@ -14032,8 +14130,8 @@
         </p:blipFill>
         <p:spPr>
           <a:xfrm>
-            <a:off x="2208276" y="4565120"/>
-            <a:ext cx="7772400" cy="1114946"/>
+            <a:off x="808262" y="4766202"/>
+            <a:ext cx="10499275" cy="1506115"/>
           </a:xfrm>
           <a:prstGeom prst="rect">
             <a:avLst/>
@@ -14056,14 +14154,15 @@
         </p:nvPicPr>
         <p:blipFill>
           <a:blip r:embed="rId4"/>
+          <a:srcRect r="571"/>
           <a:stretch>
             <a:fillRect/>
           </a:stretch>
         </p:blipFill>
         <p:spPr>
           <a:xfrm>
-            <a:off x="2208276" y="2030409"/>
-            <a:ext cx="7772400" cy="1905434"/>
+            <a:off x="838199" y="1828062"/>
+            <a:ext cx="10439400" cy="2573937"/>
           </a:xfrm>
           <a:prstGeom prst="rect">
             <a:avLst/>
@@ -14084,7 +14183,7 @@
         </p:nvSpPr>
         <p:spPr>
           <a:xfrm>
-            <a:off x="3501025" y="3999625"/>
+            <a:off x="2967102" y="4406972"/>
             <a:ext cx="6181594" cy="369332"/>
           </a:xfrm>
           <a:prstGeom prst="rect">
@@ -14128,7 +14227,7 @@
         </p:nvSpPr>
         <p:spPr>
           <a:xfrm>
-            <a:off x="3338187" y="5807631"/>
+            <a:off x="3007813" y="6306489"/>
             <a:ext cx="6100174" cy="369332"/>
           </a:xfrm>
           <a:prstGeom prst="rect">
@@ -14935,83 +15034,6 @@
           </a:p>
         </p:txBody>
       </p:sp>
-      <p:sp>
-        <p:nvSpPr>
-          <p:cNvPr id="4" name="Content Placeholder 3">
-            <a:extLst>
-              <a:ext uri="{FF2B5EF4-FFF2-40B4-BE49-F238E27FC236}">
-                <a16:creationId xmlns:a16="http://schemas.microsoft.com/office/drawing/2014/main" id="{CDADE2D2-5FA3-1703-7814-81EC7053F29F}"/>
-              </a:ext>
-            </a:extLst>
-          </p:cNvPr>
-          <p:cNvSpPr>
-            <a:spLocks noGrp="1"/>
-          </p:cNvSpPr>
-          <p:nvPr>
-            <p:ph idx="1"/>
-          </p:nvPr>
-        </p:nvSpPr>
-        <p:spPr>
-          <a:xfrm>
-            <a:off x="838200" y="1938359"/>
-            <a:ext cx="3559918" cy="4606990"/>
-          </a:xfrm>
-        </p:spPr>
-        <p:txBody>
-          <a:bodyPr>
-            <a:noAutofit/>
-          </a:bodyPr>
-          <a:lstStyle/>
-          <a:p>
-            <a:pPr algn="just">
-              <a:lnSpc>
-                <a:spcPct val="100000"/>
-              </a:lnSpc>
-            </a:pPr>
-            <a:r>
-              <a:rPr lang="en-SG" sz="2200" b="1" dirty="0"/>
-              <a:t>Single-Cycle Execution Path:</a:t>
-            </a:r>
-            <a:r>
-              <a:rPr lang="en-SG" sz="2200" dirty="0"/>
-              <a:t> Processes a complete instruction from Fetch to Write-Back within one clock period.</a:t>
-            </a:r>
-          </a:p>
-          <a:p>
-            <a:pPr algn="just">
-              <a:lnSpc>
-                <a:spcPct val="100000"/>
-              </a:lnSpc>
-            </a:pPr>
-            <a:r>
-              <a:rPr lang="en-SG" sz="2200" b="1" dirty="0"/>
-              <a:t>Longest Path Timing Constraint:</a:t>
-            </a:r>
-            <a:r>
-              <a:rPr lang="en-SG" sz="2200" dirty="0"/>
-              <a:t> The clock frequency is limited by the total accumulated delay of all combinatorial logic blocks.</a:t>
-            </a:r>
-          </a:p>
-          <a:p>
-            <a:pPr marL="0" indent="0" algn="just">
-              <a:lnSpc>
-                <a:spcPct val="100000"/>
-              </a:lnSpc>
-              <a:buNone/>
-            </a:pPr>
-            <a:endParaRPr lang="en-US" sz="2200" dirty="0"/>
-          </a:p>
-          <a:p>
-            <a:pPr marL="0" indent="0" algn="just">
-              <a:lnSpc>
-                <a:spcPct val="100000"/>
-              </a:lnSpc>
-              <a:buNone/>
-            </a:pPr>
-            <a:endParaRPr lang="en-US" sz="2200" dirty="0"/>
-          </a:p>
-        </p:txBody>
-      </p:sp>
       <p:pic>
         <p:nvPicPr>
           <p:cNvPr id="5" name="Picture 4" descr="A diagram of a computer&#10;&#10;AI-generated content may be incorrect.">
@@ -15028,14 +15050,15 @@
         </p:nvPicPr>
         <p:blipFill>
           <a:blip r:embed="rId3"/>
+          <a:srcRect l="4957" t="3878" r="5171" b="4063"/>
           <a:stretch>
             <a:fillRect/>
           </a:stretch>
         </p:blipFill>
         <p:spPr>
           <a:xfrm>
-            <a:off x="4484318" y="2350244"/>
-            <a:ext cx="7618434" cy="2657130"/>
+            <a:off x="643668" y="2033804"/>
+            <a:ext cx="11332742" cy="4048781"/>
           </a:xfrm>
           <a:prstGeom prst="rect">
             <a:avLst/>
@@ -15056,7 +15079,7 @@
         </p:nvSpPr>
         <p:spPr>
           <a:xfrm>
-            <a:off x="7503611" y="5331835"/>
+            <a:off x="4478879" y="6198444"/>
             <a:ext cx="3231193" cy="369332"/>
           </a:xfrm>
           <a:prstGeom prst="rect">
@@ -15859,72 +15882,6 @@
           </a:p>
         </p:txBody>
       </p:sp>
-      <p:sp>
-        <p:nvSpPr>
-          <p:cNvPr id="4" name="Content Placeholder 3">
-            <a:extLst>
-              <a:ext uri="{FF2B5EF4-FFF2-40B4-BE49-F238E27FC236}">
-                <a16:creationId xmlns:a16="http://schemas.microsoft.com/office/drawing/2014/main" id="{319A7F77-DC99-91D2-4800-0932BB9C5552}"/>
-              </a:ext>
-            </a:extLst>
-          </p:cNvPr>
-          <p:cNvSpPr>
-            <a:spLocks noGrp="1"/>
-          </p:cNvSpPr>
-          <p:nvPr>
-            <p:ph idx="1"/>
-          </p:nvPr>
-        </p:nvSpPr>
-        <p:spPr>
-          <a:xfrm>
-            <a:off x="1036530" y="2350244"/>
-            <a:ext cx="3758851" cy="3584826"/>
-          </a:xfrm>
-        </p:spPr>
-        <p:txBody>
-          <a:bodyPr>
-            <a:normAutofit/>
-          </a:bodyPr>
-          <a:lstStyle/>
-          <a:p>
-            <a:pPr algn="just">
-              <a:lnSpc>
-                <a:spcPct val="100000"/>
-              </a:lnSpc>
-            </a:pPr>
-            <a:r>
-              <a:rPr lang="en-SG" sz="2200" b="1" dirty="0"/>
-              <a:t>Parallelism:</a:t>
-            </a:r>
-            <a:r>
-              <a:rPr lang="en-SG" sz="2200" dirty="0"/>
-              <a:t> It overlaps multiple instructions across distinct hardware stages to maximize resource utilization.</a:t>
-            </a:r>
-          </a:p>
-          <a:p>
-            <a:pPr algn="just">
-              <a:lnSpc>
-                <a:spcPct val="100000"/>
-              </a:lnSpc>
-            </a:pPr>
-            <a:r>
-              <a:rPr lang="en-SG" sz="2200" b="1" dirty="0"/>
-              <a:t>Enhanced Throughput:</a:t>
-            </a:r>
-            <a:r>
-              <a:rPr lang="en-SG" sz="2200" dirty="0"/>
-              <a:t> Breaks the critical path into smaller segments, enabling a higher clock frequency.</a:t>
-            </a:r>
-            <a:endParaRPr lang="en-US" sz="2200" dirty="0"/>
-          </a:p>
-          <a:p>
-            <a:pPr marL="0" indent="0">
-              <a:buNone/>
-            </a:pPr>
-            <a:endParaRPr lang="en-US" dirty="0"/>
-          </a:p>
-        </p:txBody>
-      </p:sp>
       <p:pic>
         <p:nvPicPr>
           <p:cNvPr id="6" name="Picture 5" descr="A diagram of a computer&#10;&#10;AI-generated content may be incorrect.">
@@ -15941,14 +15898,15 @@
         </p:nvPicPr>
         <p:blipFill>
           <a:blip r:embed="rId3"/>
+          <a:srcRect l="5608" t="6591" r="5817" b="6584"/>
           <a:stretch>
             <a:fillRect/>
           </a:stretch>
         </p:blipFill>
         <p:spPr>
           <a:xfrm>
-            <a:off x="5160724" y="2350244"/>
-            <a:ext cx="6848752" cy="2775034"/>
+            <a:off x="747132" y="1952848"/>
+            <a:ext cx="10853928" cy="3716750"/>
           </a:xfrm>
           <a:prstGeom prst="rect">
             <a:avLst/>
@@ -15969,7 +15927,7 @@
         </p:nvSpPr>
         <p:spPr>
           <a:xfrm>
-            <a:off x="7396620" y="5465315"/>
+            <a:off x="4203005" y="5926785"/>
             <a:ext cx="3450920" cy="369332"/>
           </a:xfrm>
           <a:prstGeom prst="rect">
@@ -17881,7 +17839,7 @@
                 </a:pPr>
                 <a:r>
                   <a:rPr lang="en-US" sz="3200" dirty="0"/>
-                  <a:t>Dot Product: Consider the dot product of two 4-length signed INT-8 vectors </a:t>
+                  <a:t>Dot Product: Consider the dot product of two 4-length signed INT-8 column vectors </a:t>
                 </a:r>
                 <a14:m>
                   <m:oMath xmlns:m="http://schemas.openxmlformats.org/officeDocument/2006/math">
@@ -17929,6 +17887,12 @@
                         <m:t>𝑨</m:t>
                       </m:r>
                       <m:r>
+                        <a:rPr lang="en-US" sz="2900" b="1" i="1" baseline="30000" smtClean="0">
+                          <a:latin typeface="Cambria Math" panose="02040503050406030204" pitchFamily="18" charset="0"/>
+                        </a:rPr>
+                        <m:t>𝑻</m:t>
+                      </m:r>
+                      <m:r>
                         <a:rPr lang="en-US" sz="2900" b="1" i="1" smtClean="0">
                           <a:latin typeface="Cambria Math" panose="02040503050406030204" pitchFamily="18" charset="0"/>
                         </a:rPr>
@@ -17955,7 +17919,7 @@
                             <a:rPr lang="en-US" sz="2900" b="1" i="1" smtClean="0">
                               <a:latin typeface="Cambria Math" panose="02040503050406030204" pitchFamily="18" charset="0"/>
                             </a:rPr>
-                            <m:t>  -</m:t>
+                            <m:t>  −</m:t>
                           </m:r>
                           <m:r>
                             <a:rPr lang="en-US" sz="2900" b="1" i="1" smtClean="0">
@@ -17979,7 +17943,7 @@
                             <a:rPr lang="en-US" sz="2900" b="1" i="1" smtClean="0">
                               <a:latin typeface="Cambria Math" panose="02040503050406030204" pitchFamily="18" charset="0"/>
                             </a:rPr>
-                            <m:t>  -</m:t>
+                            <m:t>  −</m:t>
                           </m:r>
                           <m:r>
                             <a:rPr lang="en-US" sz="2900" b="1" i="1" smtClean="0">
@@ -18014,7 +17978,7 @@
                         <a:rPr lang="en-US" sz="2900" b="1" i="1" smtClean="0">
                           <a:latin typeface="Cambria Math" panose="02040503050406030204" pitchFamily="18" charset="0"/>
                         </a:rPr>
-                        <m:t>𝑩</m:t>
+                        <m:t>𝑩𝑻</m:t>
                       </m:r>
                       <m:r>
                         <a:rPr lang="en-US" sz="2900" b="1" i="1" smtClean="0">
@@ -18055,7 +18019,7 @@
                             <a:rPr lang="en-US" sz="2900" b="1" i="1" smtClean="0">
                               <a:latin typeface="Cambria Math" panose="02040503050406030204" pitchFamily="18" charset="0"/>
                             </a:rPr>
-                            <m:t>  -</m:t>
+                            <m:t>  −</m:t>
                           </m:r>
                           <m:r>
                             <a:rPr lang="en-US" sz="2900" b="1" i="1" smtClean="0">
@@ -18138,7 +18102,13 @@
                         <a:rPr lang="en-US" sz="2900" b="1" i="1">
                           <a:latin typeface="Cambria Math" panose="02040503050406030204" pitchFamily="18" charset="0"/>
                         </a:rPr>
-                        <m:t>𝑨𝑻</m:t>
+                        <m:t>𝑨</m:t>
+                      </m:r>
+                      <m:r>
+                        <a:rPr lang="en-US" sz="2900" b="1" i="1" baseline="30000">
+                          <a:latin typeface="Cambria Math" panose="02040503050406030204" pitchFamily="18" charset="0"/>
+                        </a:rPr>
+                        <m:t>𝑻</m:t>
                       </m:r>
                       <m:r>
                         <a:rPr lang="en-US" sz="2900" b="1" i="1" smtClean="0">
@@ -18269,7 +18239,7 @@
                         <a:rPr lang="en-US" sz="2900" b="1" i="1" smtClean="0">
                           <a:latin typeface="Cambria Math" panose="02040503050406030204" pitchFamily="18" charset="0"/>
                         </a:rPr>
-                        <m:t> 3)+(-2 </m:t>
+                        <m:t> 3)+(−2 </m:t>
                       </m:r>
                       <m:r>
                         <m:rPr>
@@ -18299,7 +18269,7 @@
                         <a:rPr lang="en-US" sz="2900" b="1" i="1" smtClean="0">
                           <a:latin typeface="Cambria Math" panose="02040503050406030204" pitchFamily="18" charset="0"/>
                         </a:rPr>
-                        <m:t> -5) +(-4 </m:t>
+                        <m:t> −5) +(−4 </m:t>
                       </m:r>
                       <m:r>
                         <m:rPr>
@@ -18314,7 +18284,7 @@
                         <a:rPr lang="en-US" sz="2900" b="1" i="1" smtClean="0">
                           <a:latin typeface="Cambria Math" panose="02040503050406030204" pitchFamily="18" charset="0"/>
                         </a:rPr>
-                        <m:t> 6) = -44</m:t>
+                        <m:t> 6) = −44</m:t>
                       </m:r>
                     </m:oMath>
                   </m:oMathPara>
@@ -18376,7 +18346,7 @@
               <a:blipFill>
                 <a:blip r:embed="rId3"/>
                 <a:stretch>
-                  <a:fillRect l="-601" t="-687" b="-2749"/>
+                  <a:fillRect l="-601" t="-687" r="-721" b="-11340"/>
                 </a:stretch>
               </a:blipFill>
             </p:spPr>
@@ -19222,14 +19192,15 @@
         </p:nvPicPr>
         <p:blipFill>
           <a:blip r:embed="rId3"/>
+          <a:srcRect l="6468" t="12795" r="14791" b="24768"/>
           <a:stretch>
             <a:fillRect/>
           </a:stretch>
         </p:blipFill>
         <p:spPr>
           <a:xfrm>
-            <a:off x="897313" y="2469896"/>
-            <a:ext cx="4574296" cy="3001674"/>
+            <a:off x="481937" y="2526741"/>
+            <a:ext cx="4848344" cy="2522772"/>
           </a:xfrm>
         </p:spPr>
       </p:pic>
@@ -19249,14 +19220,15 @@
         </p:nvPicPr>
         <p:blipFill>
           <a:blip r:embed="rId4"/>
+          <a:srcRect l="4064" t="14626" r="11228" b="6204"/>
           <a:stretch>
             <a:fillRect/>
           </a:stretch>
         </p:blipFill>
         <p:spPr>
           <a:xfrm>
-            <a:off x="5865541" y="2469896"/>
-            <a:ext cx="5205144" cy="3001674"/>
+            <a:off x="5425289" y="2216291"/>
+            <a:ext cx="6668651" cy="3675951"/>
           </a:xfrm>
           <a:prstGeom prst="rect">
             <a:avLst/>
@@ -19277,8 +19249,8 @@
         </p:nvSpPr>
         <p:spPr>
           <a:xfrm>
-            <a:off x="1193179" y="5742878"/>
-            <a:ext cx="4137103" cy="338554"/>
+            <a:off x="679711" y="5829112"/>
+            <a:ext cx="4452795" cy="369332"/>
           </a:xfrm>
           <a:prstGeom prst="rect">
             <a:avLst/>
@@ -19296,12 +19268,20 @@
               <a:t>Figure 1: </a:t>
             </a:r>
             <a:r>
-              <a:rPr lang="en-US" sz="1600" dirty="0" err="1"/>
+              <a:rPr lang="en-US" sz="1400" dirty="0" err="1">
+                <a:latin typeface="Monaco" pitchFamily="2" charset="77"/>
+              </a:rPr>
               <a:t>mac_unit</a:t>
             </a:r>
             <a:r>
-              <a:rPr lang="en-US" sz="1600" dirty="0"/>
-              <a:t> interface block diagram </a:t>
+              <a:rPr lang="en-US" sz="1400" dirty="0">
+                <a:latin typeface="Monaco" pitchFamily="2" charset="77"/>
+              </a:rPr>
+              <a:t> </a:t>
+            </a:r>
+            <a:r>
+              <a:rPr lang="en-US" dirty="0"/>
+              <a:t>interface block diagram </a:t>
             </a:r>
           </a:p>
         </p:txBody>
@@ -19320,7 +19300,7 @@
         </p:nvSpPr>
         <p:spPr>
           <a:xfrm>
-            <a:off x="7191144" y="5727489"/>
+            <a:off x="7191143" y="5907917"/>
             <a:ext cx="3136945" cy="369332"/>
           </a:xfrm>
           <a:prstGeom prst="rect">
@@ -19357,6 +19337,176 @@
           </a:p>
         </p:txBody>
       </p:sp>
+      <mc:AlternateContent xmlns:mc="http://schemas.openxmlformats.org/markup-compatibility/2006">
+        <mc:Choice xmlns:a14="http://schemas.microsoft.com/office/drawing/2010/main" Requires="a14">
+          <p:sp>
+            <p:nvSpPr>
+              <p:cNvPr id="4" name="TextBox 3">
+                <a:extLst>
+                  <a:ext uri="{FF2B5EF4-FFF2-40B4-BE49-F238E27FC236}">
+                    <a16:creationId xmlns:a16="http://schemas.microsoft.com/office/drawing/2014/main" id="{6CB43C6F-B1F4-0130-EC71-872A7E906C63}"/>
+                  </a:ext>
+                </a:extLst>
+              </p:cNvPr>
+              <p:cNvSpPr txBox="1"/>
+              <p:nvPr/>
+            </p:nvSpPr>
+            <p:spPr>
+              <a:xfrm>
+                <a:off x="6634254" y="6422818"/>
+                <a:ext cx="4250724" cy="369332"/>
+              </a:xfrm>
+              <a:prstGeom prst="rect">
+                <a:avLst/>
+              </a:prstGeom>
+              <a:noFill/>
+            </p:spPr>
+            <p:txBody>
+              <a:bodyPr wrap="square" rtlCol="0">
+                <a:spAutoFit/>
+              </a:bodyPr>
+              <a:lstStyle/>
+              <a:p>
+                <a14:m>
+                  <m:oMathPara xmlns:m="http://schemas.openxmlformats.org/officeDocument/2006/math">
+                    <m:oMathParaPr>
+                      <m:jc m:val="centerGroup"/>
+                    </m:oMathParaPr>
+                    <m:oMath xmlns:m="http://schemas.openxmlformats.org/officeDocument/2006/math">
+                      <m:r>
+                        <m:rPr>
+                          <m:sty m:val="p"/>
+                        </m:rPr>
+                        <a:rPr lang="en-US" b="0" i="1" smtClean="0">
+                          <a:latin typeface="Cambria Math" panose="02040503050406030204" pitchFamily="18" charset="0"/>
+                        </a:rPr>
+                        <m:t>Output</m:t>
+                      </m:r>
+                      <m:r>
+                        <a:rPr lang="en-US" b="0" i="1" smtClean="0">
+                          <a:latin typeface="Cambria Math" panose="02040503050406030204" pitchFamily="18" charset="0"/>
+                        </a:rPr>
+                        <m:t> </m:t>
+                      </m:r>
+                      <m:r>
+                        <m:rPr>
+                          <m:sty m:val="p"/>
+                        </m:rPr>
+                        <a:rPr lang="en-US" b="0" i="1" smtClean="0">
+                          <a:latin typeface="Cambria Math" panose="02040503050406030204" pitchFamily="18" charset="0"/>
+                        </a:rPr>
+                        <m:t>Sizing</m:t>
+                      </m:r>
+                      <m:r>
+                        <a:rPr lang="en-US" b="0" i="1" smtClean="0">
+                          <a:latin typeface="Cambria Math" panose="02040503050406030204" pitchFamily="18" charset="0"/>
+                        </a:rPr>
+                        <m:t> = 2</m:t>
+                      </m:r>
+                      <m:r>
+                        <m:rPr>
+                          <m:sty m:val="p"/>
+                        </m:rPr>
+                        <a:rPr lang="en-US" b="0" i="1" smtClean="0">
+                          <a:latin typeface="Cambria Math" panose="02040503050406030204" pitchFamily="18" charset="0"/>
+                        </a:rPr>
+                        <m:t>n</m:t>
+                      </m:r>
+                      <m:r>
+                        <a:rPr lang="en-US" b="0" i="1" smtClean="0">
+                          <a:latin typeface="Cambria Math" panose="02040503050406030204" pitchFamily="18" charset="0"/>
+                        </a:rPr>
+                        <m:t> + </m:t>
+                      </m:r>
+                      <m:r>
+                        <m:rPr>
+                          <m:sty m:val="p"/>
+                        </m:rPr>
+                        <a:rPr lang="en-US" b="0" i="1" smtClean="0">
+                          <a:latin typeface="Cambria Math" panose="02040503050406030204" pitchFamily="18" charset="0"/>
+                        </a:rPr>
+                        <m:t>log</m:t>
+                      </m:r>
+                      <m:r>
+                        <a:rPr lang="en-US" b="0" i="1" baseline="-25000" smtClean="0">
+                          <a:latin typeface="Cambria Math" panose="02040503050406030204" pitchFamily="18" charset="0"/>
+                        </a:rPr>
+                        <m:t>2</m:t>
+                      </m:r>
+                      <m:r>
+                        <a:rPr lang="en-US" b="0" i="1" smtClean="0">
+                          <a:latin typeface="Cambria Math" panose="02040503050406030204" pitchFamily="18" charset="0"/>
+                        </a:rPr>
+                        <m:t>(</m:t>
+                      </m:r>
+                      <m:r>
+                        <m:rPr>
+                          <m:sty m:val="p"/>
+                        </m:rPr>
+                        <a:rPr lang="en-US" b="0" i="1" smtClean="0">
+                          <a:latin typeface="Cambria Math" panose="02040503050406030204" pitchFamily="18" charset="0"/>
+                        </a:rPr>
+                        <m:t>N</m:t>
+                      </m:r>
+                      <m:r>
+                        <a:rPr lang="en-US" b="0" i="1" smtClean="0">
+                          <a:latin typeface="Cambria Math" panose="02040503050406030204" pitchFamily="18" charset="0"/>
+                        </a:rPr>
+                        <m:t>)</m:t>
+                      </m:r>
+                    </m:oMath>
+                  </m:oMathPara>
+                </a14:m>
+                <a:endParaRPr lang="en-US" dirty="0"/>
+              </a:p>
+            </p:txBody>
+          </p:sp>
+        </mc:Choice>
+        <mc:Fallback>
+          <p:sp>
+            <p:nvSpPr>
+              <p:cNvPr id="4" name="TextBox 3">
+                <a:extLst>
+                  <a:ext uri="{FF2B5EF4-FFF2-40B4-BE49-F238E27FC236}">
+                    <a16:creationId xmlns:a16="http://schemas.microsoft.com/office/drawing/2014/main" id="{6CB43C6F-B1F4-0130-EC71-872A7E906C63}"/>
+                  </a:ext>
+                </a:extLst>
+              </p:cNvPr>
+              <p:cNvSpPr txBox="1">
+                <a:spLocks noRot="1" noChangeAspect="1" noMove="1" noResize="1" noEditPoints="1" noAdjustHandles="1" noChangeArrowheads="1" noChangeShapeType="1" noTextEdit="1"/>
+              </p:cNvSpPr>
+              <p:nvPr/>
+            </p:nvSpPr>
+            <p:spPr>
+              <a:xfrm>
+                <a:off x="6634254" y="6422818"/>
+                <a:ext cx="4250724" cy="369332"/>
+              </a:xfrm>
+              <a:prstGeom prst="rect">
+                <a:avLst/>
+              </a:prstGeom>
+              <a:blipFill>
+                <a:blip r:embed="rId5"/>
+                <a:stretch>
+                  <a:fillRect b="-16667"/>
+                </a:stretch>
+              </a:blipFill>
+            </p:spPr>
+            <p:txBody>
+              <a:bodyPr/>
+              <a:lstStyle/>
+              <a:p>
+                <a:r>
+                  <a:rPr lang="en-US">
+                    <a:noFill/>
+                  </a:rPr>
+                  <a:t> </a:t>
+                </a:r>
+              </a:p>
+            </p:txBody>
+          </p:sp>
+        </mc:Fallback>
+      </mc:AlternateContent>
     </p:spTree>
     <p:extLst>
       <p:ext uri="{BB962C8B-B14F-4D97-AF65-F5344CB8AC3E}">
@@ -20148,7 +20298,7 @@
         </p:nvSpPr>
         <p:spPr>
           <a:xfrm>
-            <a:off x="6777972" y="6029167"/>
+            <a:off x="7068015" y="6029167"/>
             <a:ext cx="3725333" cy="338554"/>
           </a:xfrm>
           <a:prstGeom prst="rect">
@@ -20187,14 +20337,15 @@
         </p:nvPicPr>
         <p:blipFill>
           <a:blip r:embed="rId3"/>
+          <a:srcRect l="9592" t="7687" r="9398" b="8661"/>
           <a:stretch>
             <a:fillRect/>
           </a:stretch>
         </p:blipFill>
         <p:spPr>
           <a:xfrm>
-            <a:off x="6308984" y="2043886"/>
-            <a:ext cx="4889087" cy="3985281"/>
+            <a:off x="6690731" y="2091599"/>
+            <a:ext cx="4479903" cy="3770821"/>
           </a:xfrm>
         </p:spPr>
       </p:pic>
@@ -20212,8 +20363,8 @@
         </p:nvSpPr>
         <p:spPr>
           <a:xfrm>
-            <a:off x="838200" y="2708505"/>
-            <a:ext cx="4479903" cy="2800767"/>
+            <a:off x="838200" y="2350244"/>
+            <a:ext cx="4479903" cy="3477875"/>
           </a:xfrm>
           <a:prstGeom prst="rect">
             <a:avLst/>
@@ -20239,13 +20390,25 @@
               <a:t> A single-cycle </a:t>
             </a:r>
             <a:r>
-              <a:rPr lang="en-SG" sz="2200" dirty="0" err="1"/>
+              <a:rPr lang="en-SG" dirty="0" err="1">
+                <a:latin typeface="Monaco" pitchFamily="2" charset="77"/>
+              </a:rPr>
               <a:t>i_start</a:t>
             </a:r>
             <a:r>
+              <a:rPr lang="en-SG" dirty="0">
+                <a:latin typeface="Monaco" pitchFamily="2" charset="77"/>
+              </a:rPr>
+              <a:t> </a:t>
+            </a:r>
+            <a:r>
               <a:rPr lang="en-SG" sz="2200" dirty="0"/>
-              <a:t> launches the 3-stage pipeline.</a:t>
+              <a:t>launches the 3-stage pipeline.</a:t>
             </a:r>
+          </a:p>
+          <a:p>
+            <a:pPr algn="just"/>
+            <a:endParaRPr lang="en-SG" sz="2200" dirty="0"/>
           </a:p>
           <a:p>
             <a:pPr marL="285750" indent="-285750" algn="just">
@@ -20270,6 +20433,10 @@
             </a:r>
           </a:p>
           <a:p>
+            <a:pPr algn="just"/>
+            <a:endParaRPr lang="en-SG" sz="2200" dirty="0"/>
+          </a:p>
+          <a:p>
             <a:pPr marL="285750" indent="-285750" algn="just">
               <a:buFont typeface="Arial" panose="020B0604020202020204" pitchFamily="34" charset="0"/>
               <a:buChar char="•"/>
@@ -20283,12 +20450,20 @@
               <a:t> </a:t>
             </a:r>
             <a:r>
-              <a:rPr lang="en-SG" sz="2200" dirty="0" err="1"/>
+              <a:rPr lang="en-SG" dirty="0" err="1">
+                <a:latin typeface="Monaco" pitchFamily="2" charset="77"/>
+              </a:rPr>
               <a:t>o_valid</a:t>
             </a:r>
             <a:r>
+              <a:rPr lang="en-SG" dirty="0">
+                <a:latin typeface="Monaco" pitchFamily="2" charset="77"/>
+              </a:rPr>
+              <a:t> </a:t>
+            </a:r>
+            <a:r>
               <a:rPr lang="en-SG" sz="2200" dirty="0"/>
-              <a:t> asserts the 18-bit output.</a:t>
+              <a:t>asserts the 18-bit output.</a:t>
             </a:r>
             <a:endParaRPr lang="en-US" sz="2200" dirty="0"/>
           </a:p>
@@ -21276,7 +21451,7 @@
             </a:r>
             <a:r>
               <a:rPr lang="en-US" sz="3000" b="1" dirty="0"/>
-              <a:t> (Python-Based)</a:t>
+              <a:t> (Python-based)</a:t>
             </a:r>
           </a:p>
         </p:txBody>
@@ -22788,13 +22963,15 @@
         </p:nvPicPr>
         <p:blipFill>
           <a:blip r:embed="rId3"/>
-          <a:srcRect/>
-          <a:stretch/>
+          <a:srcRect l="12103" t="13138" r="12803" b="20782"/>
+          <a:stretch>
+            <a:fillRect/>
+          </a:stretch>
         </p:blipFill>
         <p:spPr>
           <a:xfrm>
-            <a:off x="5892259" y="2052636"/>
-            <a:ext cx="5123145" cy="3518122"/>
+            <a:off x="5921297" y="2280137"/>
+            <a:ext cx="5720575" cy="3361815"/>
           </a:xfrm>
         </p:spPr>
       </p:pic>
@@ -22812,7 +22989,7 @@
         </p:nvSpPr>
         <p:spPr>
           <a:xfrm>
-            <a:off x="6393610" y="5937680"/>
+            <a:off x="6850811" y="5772791"/>
             <a:ext cx="4120445" cy="369332"/>
           </a:xfrm>
           <a:prstGeom prst="rect">
@@ -22852,8 +23029,8 @@
         </p:nvSpPr>
         <p:spPr>
           <a:xfrm>
-            <a:off x="669036" y="1865842"/>
-            <a:ext cx="4341375" cy="4493538"/>
+            <a:off x="713339" y="2114298"/>
+            <a:ext cx="4806213" cy="4493538"/>
           </a:xfrm>
           <a:prstGeom prst="rect">
             <a:avLst/>
@@ -22880,6 +23057,10 @@
             </a:r>
           </a:p>
           <a:p>
+            <a:pPr algn="just"/>
+            <a:endParaRPr lang="en-SG" sz="2200" dirty="0"/>
+          </a:p>
+          <a:p>
             <a:pPr marL="342900" indent="-342900" algn="just">
               <a:buFont typeface="Arial" panose="020B0604020202020204" pitchFamily="34" charset="0"/>
               <a:buChar char="•"/>
@@ -22890,8 +23071,28 @@
             </a:r>
             <a:r>
               <a:rPr lang="en-SG" sz="2200" dirty="0"/>
-              <a:t>Built to support both "Stalled" (safety-first) and "Streaming" (performance-first) control logic.</a:t>
+              <a:t>Built to support both ‘</a:t>
             </a:r>
+            <a:r>
+              <a:rPr lang="en-SG" sz="2200" i="1" dirty="0"/>
+              <a:t>Stalled</a:t>
+            </a:r>
+            <a:r>
+              <a:rPr lang="en-SG" sz="2200" dirty="0"/>
+              <a:t>’ (safety-first) and ‘</a:t>
+            </a:r>
+            <a:r>
+              <a:rPr lang="en-SG" sz="2200" i="1" dirty="0"/>
+              <a:t>Streaming</a:t>
+            </a:r>
+            <a:r>
+              <a:rPr lang="en-SG" sz="2200" dirty="0"/>
+              <a:t>’ (performance-first) control logic.</a:t>
+            </a:r>
+          </a:p>
+          <a:p>
+            <a:pPr algn="just"/>
+            <a:endParaRPr lang="en-SG" sz="2200" dirty="0"/>
           </a:p>
           <a:p>
             <a:pPr marL="342900" indent="-342900" algn="just">
@@ -22904,12 +23105,89 @@
             </a:r>
             <a:r>
               <a:rPr lang="en-SG" sz="2200" dirty="0"/>
-              <a:t>: Allows for easy swapping between 'Stalled' and 'Streaming' control logic.</a:t>
+              <a:t>: Allows for easy swapping between ‘</a:t>
+            </a:r>
+            <a:r>
+              <a:rPr lang="en-SG" sz="2200" i="1" dirty="0"/>
+              <a:t>Stalled</a:t>
+            </a:r>
+            <a:r>
+              <a:rPr lang="en-SG" sz="2200" dirty="0"/>
+              <a:t>’ and ‘</a:t>
+            </a:r>
+            <a:r>
+              <a:rPr lang="en-SG" sz="2200" i="1" dirty="0"/>
+              <a:t>Streaming</a:t>
+            </a:r>
+            <a:r>
+              <a:rPr lang="en-SG" sz="2200" dirty="0"/>
+              <a:t>’ control logic.</a:t>
             </a:r>
           </a:p>
           <a:p>
             <a:pPr algn="just"/>
             <a:endParaRPr lang="en-US" sz="2200" dirty="0"/>
+          </a:p>
+        </p:txBody>
+      </p:sp>
+      <p:sp>
+        <p:nvSpPr>
+          <p:cNvPr id="3" name="TextBox 2">
+            <a:extLst>
+              <a:ext uri="{FF2B5EF4-FFF2-40B4-BE49-F238E27FC236}">
+                <a16:creationId xmlns:a16="http://schemas.microsoft.com/office/drawing/2014/main" id="{1648DB9E-6F4F-D785-0889-B915426B7D36}"/>
+              </a:ext>
+            </a:extLst>
+          </p:cNvPr>
+          <p:cNvSpPr txBox="1"/>
+          <p:nvPr/>
+        </p:nvSpPr>
+        <p:spPr>
+          <a:xfrm>
+            <a:off x="5994400" y="4826684"/>
+            <a:ext cx="1159933" cy="707886"/>
+          </a:xfrm>
+          <a:prstGeom prst="rect">
+            <a:avLst/>
+          </a:prstGeom>
+          <a:noFill/>
+        </p:spPr>
+        <p:txBody>
+          <a:bodyPr wrap="square" rtlCol="0">
+            <a:spAutoFit/>
+          </a:bodyPr>
+          <a:lstStyle/>
+          <a:p>
+            <a:r>
+              <a:rPr lang="en-US" sz="1000" dirty="0">
+                <a:latin typeface="Monaco" pitchFamily="2" charset="77"/>
+              </a:rPr>
+              <a:t>00 - NOP</a:t>
+            </a:r>
+          </a:p>
+          <a:p>
+            <a:r>
+              <a:rPr lang="en-US" sz="1000" dirty="0">
+                <a:latin typeface="Monaco" pitchFamily="2" charset="77"/>
+              </a:rPr>
+              <a:t>01 – Read </a:t>
+            </a:r>
+          </a:p>
+          <a:p>
+            <a:r>
+              <a:rPr lang="en-US" sz="1000" dirty="0">
+                <a:latin typeface="Monaco" pitchFamily="2" charset="77"/>
+              </a:rPr>
+              <a:t>10 – Write </a:t>
+            </a:r>
+          </a:p>
+          <a:p>
+            <a:r>
+              <a:rPr lang="en-US" sz="1000" dirty="0">
+                <a:latin typeface="Monaco" pitchFamily="2" charset="77"/>
+              </a:rPr>
+              <a:t>11 - Compute</a:t>
+            </a:r>
           </a:p>
         </p:txBody>
       </p:sp>
@@ -23708,14 +23986,15 @@
         </p:nvPicPr>
         <p:blipFill>
           <a:blip r:embed="rId3"/>
+          <a:srcRect l="6302" t="13410" r="5371" b="11615"/>
           <a:stretch>
             <a:fillRect/>
           </a:stretch>
         </p:blipFill>
         <p:spPr>
           <a:xfrm>
-            <a:off x="4524402" y="2094523"/>
-            <a:ext cx="2878479" cy="2043269"/>
+            <a:off x="4163058" y="1869390"/>
+            <a:ext cx="3948306" cy="2307061"/>
           </a:xfrm>
         </p:spPr>
       </p:pic>
@@ -23733,7 +24012,7 @@
         </p:nvSpPr>
         <p:spPr>
           <a:xfrm>
-            <a:off x="4077587" y="4227628"/>
+            <a:off x="4211771" y="4245916"/>
             <a:ext cx="4033777" cy="369332"/>
           </a:xfrm>
           <a:prstGeom prst="rect">
@@ -23773,7 +24052,7 @@
         </p:nvSpPr>
         <p:spPr>
           <a:xfrm>
-            <a:off x="4279040" y="6161502"/>
+            <a:off x="4211771" y="6306489"/>
             <a:ext cx="3966508" cy="369332"/>
           </a:xfrm>
           <a:prstGeom prst="rect">
@@ -23801,10 +24080,10 @@
       </p:sp>
       <p:pic>
         <p:nvPicPr>
-          <p:cNvPr id="19" name="Picture 18">
+          <p:cNvPr id="4" name="Picture 3">
             <a:extLst>
               <a:ext uri="{FF2B5EF4-FFF2-40B4-BE49-F238E27FC236}">
-                <a16:creationId xmlns:a16="http://schemas.microsoft.com/office/drawing/2014/main" id="{CA96E61A-9877-4480-32C8-7B98EB073004}"/>
+                <a16:creationId xmlns:a16="http://schemas.microsoft.com/office/drawing/2014/main" id="{2EACC0F2-72B4-6EE3-0F71-0A251B0CCF77}"/>
               </a:ext>
             </a:extLst>
           </p:cNvPr>
@@ -23821,8 +24100,8 @@
         </p:blipFill>
         <p:spPr>
           <a:xfrm>
-            <a:off x="551145" y="4870619"/>
-            <a:ext cx="10973817" cy="1218021"/>
+            <a:off x="262101" y="5061763"/>
+            <a:ext cx="11563992" cy="1136681"/>
           </a:xfrm>
           <a:prstGeom prst="rect">
             <a:avLst/>

</xml_diff>